<commit_message>
Added css rule to response to different screen size
</commit_message>
<xml_diff>
--- a/finalProject/Software Solution Technology Presentation.pptx
+++ b/finalProject/Software Solution Technology Presentation.pptx
@@ -10,22 +10,25 @@
     <p:sldId id="259" r:id="rId4"/>
     <p:sldId id="264" r:id="rId5"/>
     <p:sldId id="258" r:id="rId6"/>
-    <p:sldId id="269" r:id="rId7"/>
-    <p:sldId id="270" r:id="rId8"/>
-    <p:sldId id="273" r:id="rId9"/>
-    <p:sldId id="272" r:id="rId10"/>
-    <p:sldId id="271" r:id="rId11"/>
-    <p:sldId id="274" r:id="rId12"/>
-    <p:sldId id="275" r:id="rId13"/>
-    <p:sldId id="276" r:id="rId14"/>
-    <p:sldId id="260" r:id="rId15"/>
-    <p:sldId id="261" r:id="rId16"/>
-    <p:sldId id="266" r:id="rId17"/>
-    <p:sldId id="265" r:id="rId18"/>
-    <p:sldId id="262" r:id="rId19"/>
-    <p:sldId id="263" r:id="rId20"/>
-    <p:sldId id="267" r:id="rId21"/>
-    <p:sldId id="268" r:id="rId22"/>
+    <p:sldId id="279" r:id="rId7"/>
+    <p:sldId id="278" r:id="rId8"/>
+    <p:sldId id="277" r:id="rId9"/>
+    <p:sldId id="269" r:id="rId10"/>
+    <p:sldId id="270" r:id="rId11"/>
+    <p:sldId id="273" r:id="rId12"/>
+    <p:sldId id="272" r:id="rId13"/>
+    <p:sldId id="271" r:id="rId14"/>
+    <p:sldId id="274" r:id="rId15"/>
+    <p:sldId id="275" r:id="rId16"/>
+    <p:sldId id="276" r:id="rId17"/>
+    <p:sldId id="260" r:id="rId18"/>
+    <p:sldId id="261" r:id="rId19"/>
+    <p:sldId id="266" r:id="rId20"/>
+    <p:sldId id="265" r:id="rId21"/>
+    <p:sldId id="262" r:id="rId22"/>
+    <p:sldId id="263" r:id="rId23"/>
+    <p:sldId id="267" r:id="rId24"/>
+    <p:sldId id="268" r:id="rId25"/>
   </p:sldIdLst>
   <p:sldSz cx="12192000" cy="6858000"/>
   <p:notesSz cx="6858000" cy="9144000"/>
@@ -3444,6 +3447,310 @@
           <a:chExt cx="0" cy="0"/>
         </a:xfrm>
       </p:grpSpPr>
+      <p:pic>
+        <p:nvPicPr>
+          <p:cNvPr id="7" name="Picture 6">
+            <a:extLst>
+              <a:ext uri="{FF2B5EF4-FFF2-40B4-BE49-F238E27FC236}">
+                <a16:creationId xmlns:a16="http://schemas.microsoft.com/office/drawing/2014/main" id="{B0C85D0E-4052-DC50-5A82-A6BAB0204701}"/>
+              </a:ext>
+            </a:extLst>
+          </p:cNvPr>
+          <p:cNvPicPr>
+            <a:picLocks noChangeAspect="1"/>
+          </p:cNvPicPr>
+          <p:nvPr/>
+        </p:nvPicPr>
+        <p:blipFill>
+          <a:blip r:embed="rId2"/>
+          <a:stretch>
+            <a:fillRect/>
+          </a:stretch>
+        </p:blipFill>
+        <p:spPr>
+          <a:xfrm>
+            <a:off x="637553" y="1357934"/>
+            <a:ext cx="8829675" cy="4400550"/>
+          </a:xfrm>
+          <a:prstGeom prst="rect">
+            <a:avLst/>
+          </a:prstGeom>
+        </p:spPr>
+      </p:pic>
+      <p:sp>
+        <p:nvSpPr>
+          <p:cNvPr id="2" name="Title 1">
+            <a:extLst>
+              <a:ext uri="{FF2B5EF4-FFF2-40B4-BE49-F238E27FC236}">
+                <a16:creationId xmlns:a16="http://schemas.microsoft.com/office/drawing/2014/main" id="{3DB27BDF-19BC-2189-BBBB-8AB5A212C081}"/>
+              </a:ext>
+            </a:extLst>
+          </p:cNvPr>
+          <p:cNvSpPr>
+            <a:spLocks noGrp="1"/>
+          </p:cNvSpPr>
+          <p:nvPr>
+            <p:ph type="title"/>
+          </p:nvPr>
+        </p:nvSpPr>
+        <p:spPr/>
+        <p:txBody>
+          <a:bodyPr/>
+          <a:lstStyle/>
+          <a:p>
+            <a:r>
+              <a:rPr lang="en-US" dirty="0"/>
+              <a:t>PayPal Sandbox Account</a:t>
+            </a:r>
+          </a:p>
+        </p:txBody>
+      </p:sp>
+      <p:pic>
+        <p:nvPicPr>
+          <p:cNvPr id="9" name="Picture 8">
+            <a:extLst>
+              <a:ext uri="{FF2B5EF4-FFF2-40B4-BE49-F238E27FC236}">
+                <a16:creationId xmlns:a16="http://schemas.microsoft.com/office/drawing/2014/main" id="{D40CCDE5-6F36-BEF2-811B-DB2967FAF748}"/>
+              </a:ext>
+            </a:extLst>
+          </p:cNvPr>
+          <p:cNvPicPr>
+            <a:picLocks noChangeAspect="1"/>
+          </p:cNvPicPr>
+          <p:nvPr/>
+        </p:nvPicPr>
+        <p:blipFill>
+          <a:blip r:embed="rId3"/>
+          <a:stretch>
+            <a:fillRect/>
+          </a:stretch>
+        </p:blipFill>
+        <p:spPr>
+          <a:xfrm>
+            <a:off x="4461442" y="2116751"/>
+            <a:ext cx="7093005" cy="4462954"/>
+          </a:xfrm>
+          <a:prstGeom prst="rect">
+            <a:avLst/>
+          </a:prstGeom>
+        </p:spPr>
+      </p:pic>
+    </p:spTree>
+    <p:extLst>
+      <p:ext uri="{BB962C8B-B14F-4D97-AF65-F5344CB8AC3E}">
+        <p14:creationId xmlns:p14="http://schemas.microsoft.com/office/powerpoint/2010/main" val="1783202218"/>
+      </p:ext>
+    </p:extLst>
+  </p:cSld>
+  <p:clrMapOvr>
+    <a:masterClrMapping/>
+  </p:clrMapOvr>
+</p:sld>
+</file>
+
+<file path=ppt/slides/slide11.xml><?xml version="1.0" encoding="utf-8"?>
+<p:sld xmlns:a="http://schemas.openxmlformats.org/drawingml/2006/main" xmlns:r="http://schemas.openxmlformats.org/officeDocument/2006/relationships" xmlns:p="http://schemas.openxmlformats.org/presentationml/2006/main">
+  <p:cSld>
+    <p:spTree>
+      <p:nvGrpSpPr>
+        <p:cNvPr id="1" name=""/>
+        <p:cNvGrpSpPr/>
+        <p:nvPr/>
+      </p:nvGrpSpPr>
+      <p:grpSpPr>
+        <a:xfrm>
+          <a:off x="0" y="0"/>
+          <a:ext cx="0" cy="0"/>
+          <a:chOff x="0" y="0"/>
+          <a:chExt cx="0" cy="0"/>
+        </a:xfrm>
+      </p:grpSpPr>
+      <p:sp>
+        <p:nvSpPr>
+          <p:cNvPr id="2" name="Title 1">
+            <a:extLst>
+              <a:ext uri="{FF2B5EF4-FFF2-40B4-BE49-F238E27FC236}">
+                <a16:creationId xmlns:a16="http://schemas.microsoft.com/office/drawing/2014/main" id="{7F668DA0-1651-1036-6E63-8BF74751E363}"/>
+              </a:ext>
+            </a:extLst>
+          </p:cNvPr>
+          <p:cNvSpPr>
+            <a:spLocks noGrp="1"/>
+          </p:cNvSpPr>
+          <p:nvPr>
+            <p:ph type="title"/>
+          </p:nvPr>
+        </p:nvSpPr>
+        <p:spPr>
+          <a:xfrm>
+            <a:off x="768626" y="0"/>
+            <a:ext cx="10515600" cy="1325563"/>
+          </a:xfrm>
+        </p:spPr>
+        <p:txBody>
+          <a:bodyPr/>
+          <a:lstStyle/>
+          <a:p>
+            <a:r>
+              <a:rPr lang="en-US" dirty="0"/>
+              <a:t>Add to Cart</a:t>
+            </a:r>
+          </a:p>
+        </p:txBody>
+      </p:sp>
+      <p:pic>
+        <p:nvPicPr>
+          <p:cNvPr id="5" name="Picture 4">
+            <a:extLst>
+              <a:ext uri="{FF2B5EF4-FFF2-40B4-BE49-F238E27FC236}">
+                <a16:creationId xmlns:a16="http://schemas.microsoft.com/office/drawing/2014/main" id="{E2F1F9E6-8074-EFD4-B4C0-768C9FFBFEA4}"/>
+              </a:ext>
+            </a:extLst>
+          </p:cNvPr>
+          <p:cNvPicPr>
+            <a:picLocks noChangeAspect="1"/>
+          </p:cNvPicPr>
+          <p:nvPr/>
+        </p:nvPicPr>
+        <p:blipFill>
+          <a:blip r:embed="rId2"/>
+          <a:stretch>
+            <a:fillRect/>
+          </a:stretch>
+        </p:blipFill>
+        <p:spPr>
+          <a:xfrm>
+            <a:off x="1381538" y="1165980"/>
+            <a:ext cx="8733061" cy="5692020"/>
+          </a:xfrm>
+          <a:prstGeom prst="rect">
+            <a:avLst/>
+          </a:prstGeom>
+        </p:spPr>
+      </p:pic>
+    </p:spTree>
+    <p:extLst>
+      <p:ext uri="{BB962C8B-B14F-4D97-AF65-F5344CB8AC3E}">
+        <p14:creationId xmlns:p14="http://schemas.microsoft.com/office/powerpoint/2010/main" val="4178321967"/>
+      </p:ext>
+    </p:extLst>
+  </p:cSld>
+  <p:clrMapOvr>
+    <a:masterClrMapping/>
+  </p:clrMapOvr>
+</p:sld>
+</file>
+
+<file path=ppt/slides/slide12.xml><?xml version="1.0" encoding="utf-8"?>
+<p:sld xmlns:a="http://schemas.openxmlformats.org/drawingml/2006/main" xmlns:r="http://schemas.openxmlformats.org/officeDocument/2006/relationships" xmlns:p="http://schemas.openxmlformats.org/presentationml/2006/main">
+  <p:cSld>
+    <p:spTree>
+      <p:nvGrpSpPr>
+        <p:cNvPr id="1" name=""/>
+        <p:cNvGrpSpPr/>
+        <p:nvPr/>
+      </p:nvGrpSpPr>
+      <p:grpSpPr>
+        <a:xfrm>
+          <a:off x="0" y="0"/>
+          <a:ext cx="0" cy="0"/>
+          <a:chOff x="0" y="0"/>
+          <a:chExt cx="0" cy="0"/>
+        </a:xfrm>
+      </p:grpSpPr>
+      <p:pic>
+        <p:nvPicPr>
+          <p:cNvPr id="5" name="Picture 4">
+            <a:extLst>
+              <a:ext uri="{FF2B5EF4-FFF2-40B4-BE49-F238E27FC236}">
+                <a16:creationId xmlns:a16="http://schemas.microsoft.com/office/drawing/2014/main" id="{BA5DE88D-31C3-A493-D3EA-1B5DE6765E60}"/>
+              </a:ext>
+            </a:extLst>
+          </p:cNvPr>
+          <p:cNvPicPr>
+            <a:picLocks noChangeAspect="1"/>
+          </p:cNvPicPr>
+          <p:nvPr/>
+        </p:nvPicPr>
+        <p:blipFill>
+          <a:blip r:embed="rId2"/>
+          <a:stretch>
+            <a:fillRect/>
+          </a:stretch>
+        </p:blipFill>
+        <p:spPr>
+          <a:xfrm>
+            <a:off x="1043609" y="974981"/>
+            <a:ext cx="10719766" cy="5206743"/>
+          </a:xfrm>
+          <a:prstGeom prst="rect">
+            <a:avLst/>
+          </a:prstGeom>
+        </p:spPr>
+      </p:pic>
+      <p:sp>
+        <p:nvSpPr>
+          <p:cNvPr id="6" name="Title 1">
+            <a:extLst>
+              <a:ext uri="{FF2B5EF4-FFF2-40B4-BE49-F238E27FC236}">
+                <a16:creationId xmlns:a16="http://schemas.microsoft.com/office/drawing/2014/main" id="{FC92EA05-0495-C6C1-8C3C-AB11D0982153}"/>
+              </a:ext>
+            </a:extLst>
+          </p:cNvPr>
+          <p:cNvSpPr>
+            <a:spLocks noGrp="1"/>
+          </p:cNvSpPr>
+          <p:nvPr>
+            <p:ph type="title"/>
+          </p:nvPr>
+        </p:nvSpPr>
+        <p:spPr>
+          <a:xfrm>
+            <a:off x="634034" y="96769"/>
+            <a:ext cx="10338766" cy="976658"/>
+          </a:xfrm>
+        </p:spPr>
+        <p:txBody>
+          <a:bodyPr/>
+          <a:lstStyle/>
+          <a:p>
+            <a:r>
+              <a:rPr lang="en-US" dirty="0"/>
+              <a:t>Add to Cart</a:t>
+            </a:r>
+          </a:p>
+        </p:txBody>
+      </p:sp>
+    </p:spTree>
+    <p:extLst>
+      <p:ext uri="{BB962C8B-B14F-4D97-AF65-F5344CB8AC3E}">
+        <p14:creationId xmlns:p14="http://schemas.microsoft.com/office/powerpoint/2010/main" val="939074690"/>
+      </p:ext>
+    </p:extLst>
+  </p:cSld>
+  <p:clrMapOvr>
+    <a:masterClrMapping/>
+  </p:clrMapOvr>
+</p:sld>
+</file>
+
+<file path=ppt/slides/slide13.xml><?xml version="1.0" encoding="utf-8"?>
+<p:sld xmlns:a="http://schemas.openxmlformats.org/drawingml/2006/main" xmlns:r="http://schemas.openxmlformats.org/officeDocument/2006/relationships" xmlns:p="http://schemas.openxmlformats.org/presentationml/2006/main">
+  <p:cSld>
+    <p:spTree>
+      <p:nvGrpSpPr>
+        <p:cNvPr id="1" name=""/>
+        <p:cNvGrpSpPr/>
+        <p:nvPr/>
+      </p:nvGrpSpPr>
+      <p:grpSpPr>
+        <a:xfrm>
+          <a:off x="0" y="0"/>
+          <a:ext cx="0" cy="0"/>
+          <a:chOff x="0" y="0"/>
+          <a:chExt cx="0" cy="0"/>
+        </a:xfrm>
+      </p:grpSpPr>
       <p:sp>
         <p:nvSpPr>
           <p:cNvPr id="2" name="Title 1">
@@ -3520,7 +3827,7 @@
 </p:sld>
 </file>
 
-<file path=ppt/slides/slide11.xml><?xml version="1.0" encoding="utf-8"?>
+<file path=ppt/slides/slide14.xml><?xml version="1.0" encoding="utf-8"?>
 <p:sld xmlns:a="http://schemas.openxmlformats.org/drawingml/2006/main" xmlns:r="http://schemas.openxmlformats.org/officeDocument/2006/relationships" xmlns:p="http://schemas.openxmlformats.org/presentationml/2006/main">
   <p:cSld>
     <p:spTree>
@@ -3660,7 +3967,7 @@
 </p:sld>
 </file>
 
-<file path=ppt/slides/slide12.xml><?xml version="1.0" encoding="utf-8"?>
+<file path=ppt/slides/slide15.xml><?xml version="1.0" encoding="utf-8"?>
 <p:sld xmlns:a="http://schemas.openxmlformats.org/drawingml/2006/main" xmlns:r="http://schemas.openxmlformats.org/officeDocument/2006/relationships" xmlns:p="http://schemas.openxmlformats.org/presentationml/2006/main">
   <p:cSld>
     <p:spTree>
@@ -3800,7 +4107,7 @@
 </p:sld>
 </file>
 
-<file path=ppt/slides/slide13.xml><?xml version="1.0" encoding="utf-8"?>
+<file path=ppt/slides/slide16.xml><?xml version="1.0" encoding="utf-8"?>
 <p:sld xmlns:a="http://schemas.openxmlformats.org/drawingml/2006/main" xmlns:r="http://schemas.openxmlformats.org/officeDocument/2006/relationships" xmlns:p="http://schemas.openxmlformats.org/presentationml/2006/main">
   <p:cSld>
     <p:spTree>
@@ -3899,7 +4206,7 @@
 </p:sld>
 </file>
 
-<file path=ppt/slides/slide14.xml><?xml version="1.0" encoding="utf-8"?>
+<file path=ppt/slides/slide17.xml><?xml version="1.0" encoding="utf-8"?>
 <p:sld xmlns:a="http://schemas.openxmlformats.org/drawingml/2006/main" xmlns:r="http://schemas.openxmlformats.org/officeDocument/2006/relationships" xmlns:p="http://schemas.openxmlformats.org/presentationml/2006/main">
   <p:cSld>
     <p:spTree>
@@ -4021,7 +4328,7 @@
 </p:sld>
 </file>
 
-<file path=ppt/slides/slide15.xml><?xml version="1.0" encoding="utf-8"?>
+<file path=ppt/slides/slide18.xml><?xml version="1.0" encoding="utf-8"?>
 <p:sld xmlns:a="http://schemas.openxmlformats.org/drawingml/2006/main" xmlns:r="http://schemas.openxmlformats.org/officeDocument/2006/relationships" xmlns:p="http://schemas.openxmlformats.org/presentationml/2006/main">
   <p:cSld>
     <p:spTree>
@@ -4174,7 +4481,7 @@
 </p:sld>
 </file>
 
-<file path=ppt/slides/slide16.xml><?xml version="1.0" encoding="utf-8"?>
+<file path=ppt/slides/slide19.xml><?xml version="1.0" encoding="utf-8"?>
 <p:sld xmlns:a="http://schemas.openxmlformats.org/drawingml/2006/main" xmlns:r="http://schemas.openxmlformats.org/officeDocument/2006/relationships" xmlns:p="http://schemas.openxmlformats.org/presentationml/2006/main">
   <p:cSld>
     <p:spTree>
@@ -4292,526 +4599,6 @@
 </p:sld>
 </file>
 
-<file path=ppt/slides/slide17.xml><?xml version="1.0" encoding="utf-8"?>
-<p:sld xmlns:a="http://schemas.openxmlformats.org/drawingml/2006/main" xmlns:r="http://schemas.openxmlformats.org/officeDocument/2006/relationships" xmlns:p="http://schemas.openxmlformats.org/presentationml/2006/main">
-  <p:cSld>
-    <p:spTree>
-      <p:nvGrpSpPr>
-        <p:cNvPr id="1" name=""/>
-        <p:cNvGrpSpPr/>
-        <p:nvPr/>
-      </p:nvGrpSpPr>
-      <p:grpSpPr>
-        <a:xfrm>
-          <a:off x="0" y="0"/>
-          <a:ext cx="0" cy="0"/>
-          <a:chOff x="0" y="0"/>
-          <a:chExt cx="0" cy="0"/>
-        </a:xfrm>
-      </p:grpSpPr>
-      <p:sp>
-        <p:nvSpPr>
-          <p:cNvPr id="2" name="Title 1">
-            <a:extLst>
-              <a:ext uri="{FF2B5EF4-FFF2-40B4-BE49-F238E27FC236}">
-                <a16:creationId xmlns:a16="http://schemas.microsoft.com/office/drawing/2014/main" id="{9CC06D26-F368-1E45-450D-433368A7C8F3}"/>
-              </a:ext>
-            </a:extLst>
-          </p:cNvPr>
-          <p:cNvSpPr>
-            <a:spLocks noGrp="1"/>
-          </p:cNvSpPr>
-          <p:nvPr>
-            <p:ph type="title"/>
-          </p:nvPr>
-        </p:nvSpPr>
-        <p:spPr/>
-        <p:txBody>
-          <a:bodyPr/>
-          <a:lstStyle/>
-          <a:p>
-            <a:r>
-              <a:rPr lang="en-US" dirty="0"/>
-              <a:t>Security</a:t>
-            </a:r>
-          </a:p>
-        </p:txBody>
-      </p:sp>
-      <p:sp>
-        <p:nvSpPr>
-          <p:cNvPr id="3" name="Content Placeholder 2">
-            <a:extLst>
-              <a:ext uri="{FF2B5EF4-FFF2-40B4-BE49-F238E27FC236}">
-                <a16:creationId xmlns:a16="http://schemas.microsoft.com/office/drawing/2014/main" id="{7A98AAB6-3689-0359-AD35-BF41BACC7F94}"/>
-              </a:ext>
-            </a:extLst>
-          </p:cNvPr>
-          <p:cNvSpPr>
-            <a:spLocks noGrp="1"/>
-          </p:cNvSpPr>
-          <p:nvPr>
-            <p:ph idx="1"/>
-          </p:nvPr>
-        </p:nvSpPr>
-        <p:spPr>
-          <a:xfrm>
-            <a:off x="838200" y="1825624"/>
-            <a:ext cx="10515600" cy="4875213"/>
-          </a:xfrm>
-        </p:spPr>
-        <p:txBody>
-          <a:bodyPr>
-            <a:normAutofit fontScale="92500"/>
-          </a:bodyPr>
-          <a:lstStyle/>
-          <a:p>
-            <a:r>
-              <a:rPr lang="en-US" dirty="0"/>
-              <a:t>Encrypting Password: </a:t>
-            </a:r>
-          </a:p>
-          <a:p>
-            <a:pPr marL="0" indent="0">
-              <a:buNone/>
-            </a:pPr>
-            <a:r>
-              <a:rPr lang="en-US" sz="2000" dirty="0">
-                <a:solidFill>
-                  <a:srgbClr val="569CD6"/>
-                </a:solidFill>
-                <a:latin typeface="Consolas" panose="020B0609020204030204" pitchFamily="49" charset="0"/>
-              </a:rPr>
-              <a:t>  </a:t>
-            </a:r>
-            <a:r>
-              <a:rPr lang="en-US" sz="2600" dirty="0">
-                <a:solidFill>
-                  <a:schemeClr val="accent2">
-                    <a:lumMod val="75000"/>
-                  </a:schemeClr>
-                </a:solidFill>
-                <a:latin typeface="Consolas" panose="020B0609020204030204" pitchFamily="49" charset="0"/>
-              </a:rPr>
-              <a:t>const </a:t>
-            </a:r>
-            <a:r>
-              <a:rPr lang="en-US" sz="2600" dirty="0" err="1">
-                <a:solidFill>
-                  <a:schemeClr val="accent2">
-                    <a:lumMod val="75000"/>
-                  </a:schemeClr>
-                </a:solidFill>
-                <a:latin typeface="Consolas" panose="020B0609020204030204" pitchFamily="49" charset="0"/>
-              </a:rPr>
-              <a:t>encryptedPassword</a:t>
-            </a:r>
-            <a:r>
-              <a:rPr lang="en-US" sz="2600" dirty="0">
-                <a:solidFill>
-                  <a:schemeClr val="accent2">
-                    <a:lumMod val="75000"/>
-                  </a:schemeClr>
-                </a:solidFill>
-                <a:latin typeface="Consolas" panose="020B0609020204030204" pitchFamily="49" charset="0"/>
-              </a:rPr>
-              <a:t> = await </a:t>
-            </a:r>
-            <a:r>
-              <a:rPr lang="en-US" sz="2600" dirty="0" err="1">
-                <a:solidFill>
-                  <a:schemeClr val="accent2">
-                    <a:lumMod val="75000"/>
-                  </a:schemeClr>
-                </a:solidFill>
-                <a:latin typeface="Consolas" panose="020B0609020204030204" pitchFamily="49" charset="0"/>
-              </a:rPr>
-              <a:t>bcrypt.hash</a:t>
-            </a:r>
-            <a:r>
-              <a:rPr lang="en-US" sz="2600" dirty="0">
-                <a:solidFill>
-                  <a:schemeClr val="accent2">
-                    <a:lumMod val="75000"/>
-                  </a:schemeClr>
-                </a:solidFill>
-                <a:latin typeface="Consolas" panose="020B0609020204030204" pitchFamily="49" charset="0"/>
-              </a:rPr>
-              <a:t>(password, 10);</a:t>
-            </a:r>
-          </a:p>
-          <a:p>
-            <a:pPr marL="0" indent="0">
-              <a:buNone/>
-            </a:pPr>
-            <a:endParaRPr lang="en-US" dirty="0"/>
-          </a:p>
-          <a:p>
-            <a:pPr marL="0" indent="0">
-              <a:buNone/>
-            </a:pPr>
-            <a:endParaRPr lang="en-US" dirty="0"/>
-          </a:p>
-          <a:p>
-            <a:pPr marL="0" indent="0">
-              <a:buNone/>
-            </a:pPr>
-            <a:endParaRPr lang="en-US" dirty="0"/>
-          </a:p>
-          <a:p>
-            <a:r>
-              <a:rPr lang="en-US" dirty="0"/>
-              <a:t>Authenticating with Guard: Validates user’s access</a:t>
-            </a:r>
-          </a:p>
-          <a:p>
-            <a:pPr marL="0" indent="0">
-              <a:buNone/>
-            </a:pPr>
-            <a:r>
-              <a:rPr lang="en-US" dirty="0"/>
-              <a:t>   </a:t>
-            </a:r>
-            <a:r>
-              <a:rPr lang="en-US" dirty="0">
-                <a:solidFill>
-                  <a:schemeClr val="accent2">
-                    <a:lumMod val="75000"/>
-                  </a:schemeClr>
-                </a:solidFill>
-                <a:latin typeface="Consolas" panose="020B0609020204030204" pitchFamily="49" charset="0"/>
-              </a:rPr>
-              <a:t>ng g guard auth</a:t>
-            </a:r>
-          </a:p>
-          <a:p>
-            <a:r>
-              <a:rPr lang="en-US" dirty="0"/>
-              <a:t>Add authentication Token: Attach authentication tokens and credential</a:t>
-            </a:r>
-          </a:p>
-          <a:p>
-            <a:pPr marL="0" indent="0">
-              <a:lnSpc>
-                <a:spcPct val="100000"/>
-              </a:lnSpc>
-              <a:buNone/>
-            </a:pPr>
-            <a:r>
-              <a:rPr lang="en-US" dirty="0"/>
-              <a:t>   </a:t>
-            </a:r>
-            <a:r>
-              <a:rPr lang="en-US" dirty="0">
-                <a:solidFill>
-                  <a:schemeClr val="accent2">
-                    <a:lumMod val="75000"/>
-                  </a:schemeClr>
-                </a:solidFill>
-                <a:latin typeface="Consolas" panose="020B0609020204030204" pitchFamily="49" charset="0"/>
-              </a:rPr>
-              <a:t>ng g interceptor auth</a:t>
-            </a:r>
-          </a:p>
-          <a:p>
-            <a:r>
-              <a:rPr lang="en-US" dirty="0"/>
-              <a:t>Authentication with Username and Password</a:t>
-            </a:r>
-          </a:p>
-        </p:txBody>
-      </p:sp>
-      <p:pic>
-        <p:nvPicPr>
-          <p:cNvPr id="5" name="Picture 4">
-            <a:extLst>
-              <a:ext uri="{FF2B5EF4-FFF2-40B4-BE49-F238E27FC236}">
-                <a16:creationId xmlns:a16="http://schemas.microsoft.com/office/drawing/2014/main" id="{327B2DE7-31EC-C915-5C17-A47483D8686E}"/>
-              </a:ext>
-            </a:extLst>
-          </p:cNvPr>
-          <p:cNvPicPr>
-            <a:picLocks noChangeAspect="1"/>
-          </p:cNvPicPr>
-          <p:nvPr/>
-        </p:nvPicPr>
-        <p:blipFill>
-          <a:blip r:embed="rId2"/>
-          <a:stretch>
-            <a:fillRect/>
-          </a:stretch>
-        </p:blipFill>
-        <p:spPr>
-          <a:xfrm>
-            <a:off x="2943018" y="2763078"/>
-            <a:ext cx="5610225" cy="914400"/>
-          </a:xfrm>
-          <a:prstGeom prst="rect">
-            <a:avLst/>
-          </a:prstGeom>
-        </p:spPr>
-      </p:pic>
-      <p:sp>
-        <p:nvSpPr>
-          <p:cNvPr id="6" name="Rectangle 5">
-            <a:extLst>
-              <a:ext uri="{FF2B5EF4-FFF2-40B4-BE49-F238E27FC236}">
-                <a16:creationId xmlns:a16="http://schemas.microsoft.com/office/drawing/2014/main" id="{590141D1-38AC-ECA0-784B-C941687999EA}"/>
-              </a:ext>
-            </a:extLst>
-          </p:cNvPr>
-          <p:cNvSpPr/>
-          <p:nvPr/>
-        </p:nvSpPr>
-        <p:spPr>
-          <a:xfrm>
-            <a:off x="5748130" y="2844205"/>
-            <a:ext cx="1252331" cy="228600"/>
-          </a:xfrm>
-          <a:prstGeom prst="rect">
-            <a:avLst/>
-          </a:prstGeom>
-          <a:noFill/>
-        </p:spPr>
-        <p:style>
-          <a:lnRef idx="2">
-            <a:schemeClr val="accent1">
-              <a:shade val="15000"/>
-            </a:schemeClr>
-          </a:lnRef>
-          <a:fillRef idx="1">
-            <a:schemeClr val="accent1"/>
-          </a:fillRef>
-          <a:effectRef idx="0">
-            <a:schemeClr val="accent1"/>
-          </a:effectRef>
-          <a:fontRef idx="minor">
-            <a:schemeClr val="lt1"/>
-          </a:fontRef>
-        </p:style>
-        <p:txBody>
-          <a:bodyPr rtlCol="0" anchor="ctr"/>
-          <a:lstStyle/>
-          <a:p>
-            <a:pPr algn="ctr"/>
-            <a:r>
-              <a:rPr lang="en-US" dirty="0">
-                <a:solidFill>
-                  <a:schemeClr val="bg1"/>
-                </a:solidFill>
-              </a:rPr>
-              <a:t>12345</a:t>
-            </a:r>
-          </a:p>
-        </p:txBody>
-      </p:sp>
-    </p:spTree>
-    <p:extLst>
-      <p:ext uri="{BB962C8B-B14F-4D97-AF65-F5344CB8AC3E}">
-        <p14:creationId xmlns:p14="http://schemas.microsoft.com/office/powerpoint/2010/main" val="4280587274"/>
-      </p:ext>
-    </p:extLst>
-  </p:cSld>
-  <p:clrMapOvr>
-    <a:masterClrMapping/>
-  </p:clrMapOvr>
-</p:sld>
-</file>
-
-<file path=ppt/slides/slide18.xml><?xml version="1.0" encoding="utf-8"?>
-<p:sld xmlns:a="http://schemas.openxmlformats.org/drawingml/2006/main" xmlns:r="http://schemas.openxmlformats.org/officeDocument/2006/relationships" xmlns:p="http://schemas.openxmlformats.org/presentationml/2006/main">
-  <p:cSld>
-    <p:spTree>
-      <p:nvGrpSpPr>
-        <p:cNvPr id="1" name=""/>
-        <p:cNvGrpSpPr/>
-        <p:nvPr/>
-      </p:nvGrpSpPr>
-      <p:grpSpPr>
-        <a:xfrm>
-          <a:off x="0" y="0"/>
-          <a:ext cx="0" cy="0"/>
-          <a:chOff x="0" y="0"/>
-          <a:chExt cx="0" cy="0"/>
-        </a:xfrm>
-      </p:grpSpPr>
-      <p:sp>
-        <p:nvSpPr>
-          <p:cNvPr id="2" name="Title 1">
-            <a:extLst>
-              <a:ext uri="{FF2B5EF4-FFF2-40B4-BE49-F238E27FC236}">
-                <a16:creationId xmlns:a16="http://schemas.microsoft.com/office/drawing/2014/main" id="{176307F7-9C7C-0409-D4B7-A1A9EE479207}"/>
-              </a:ext>
-            </a:extLst>
-          </p:cNvPr>
-          <p:cNvSpPr>
-            <a:spLocks noGrp="1"/>
-          </p:cNvSpPr>
-          <p:nvPr>
-            <p:ph type="title"/>
-          </p:nvPr>
-        </p:nvSpPr>
-        <p:spPr/>
-        <p:txBody>
-          <a:bodyPr/>
-          <a:lstStyle/>
-          <a:p>
-            <a:r>
-              <a:rPr lang="en-US" dirty="0"/>
-              <a:t>Lesson learned</a:t>
-            </a:r>
-          </a:p>
-        </p:txBody>
-      </p:sp>
-      <p:sp>
-        <p:nvSpPr>
-          <p:cNvPr id="3" name="Content Placeholder 2">
-            <a:extLst>
-              <a:ext uri="{FF2B5EF4-FFF2-40B4-BE49-F238E27FC236}">
-                <a16:creationId xmlns:a16="http://schemas.microsoft.com/office/drawing/2014/main" id="{A64355DE-46E2-D4EF-F04E-36B94BA8DDC6}"/>
-              </a:ext>
-            </a:extLst>
-          </p:cNvPr>
-          <p:cNvSpPr>
-            <a:spLocks noGrp="1"/>
-          </p:cNvSpPr>
-          <p:nvPr>
-            <p:ph idx="1"/>
-          </p:nvPr>
-        </p:nvSpPr>
-        <p:spPr/>
-        <p:txBody>
-          <a:bodyPr/>
-          <a:lstStyle/>
-          <a:p>
-            <a:r>
-              <a:rPr lang="en-US" dirty="0"/>
-              <a:t>Work on Software Design first</a:t>
-            </a:r>
-          </a:p>
-        </p:txBody>
-      </p:sp>
-    </p:spTree>
-    <p:extLst>
-      <p:ext uri="{BB962C8B-B14F-4D97-AF65-F5344CB8AC3E}">
-        <p14:creationId xmlns:p14="http://schemas.microsoft.com/office/powerpoint/2010/main" val="4260835562"/>
-      </p:ext>
-    </p:extLst>
-  </p:cSld>
-  <p:clrMapOvr>
-    <a:masterClrMapping/>
-  </p:clrMapOvr>
-</p:sld>
-</file>
-
-<file path=ppt/slides/slide19.xml><?xml version="1.0" encoding="utf-8"?>
-<p:sld xmlns:a="http://schemas.openxmlformats.org/drawingml/2006/main" xmlns:r="http://schemas.openxmlformats.org/officeDocument/2006/relationships" xmlns:p="http://schemas.openxmlformats.org/presentationml/2006/main">
-  <p:cSld>
-    <p:spTree>
-      <p:nvGrpSpPr>
-        <p:cNvPr id="1" name=""/>
-        <p:cNvGrpSpPr/>
-        <p:nvPr/>
-      </p:nvGrpSpPr>
-      <p:grpSpPr>
-        <a:xfrm>
-          <a:off x="0" y="0"/>
-          <a:ext cx="0" cy="0"/>
-          <a:chOff x="0" y="0"/>
-          <a:chExt cx="0" cy="0"/>
-        </a:xfrm>
-      </p:grpSpPr>
-      <p:sp>
-        <p:nvSpPr>
-          <p:cNvPr id="2" name="Title 1">
-            <a:extLst>
-              <a:ext uri="{FF2B5EF4-FFF2-40B4-BE49-F238E27FC236}">
-                <a16:creationId xmlns:a16="http://schemas.microsoft.com/office/drawing/2014/main" id="{95199C25-EDB0-2F7C-3100-6037A924CAB2}"/>
-              </a:ext>
-            </a:extLst>
-          </p:cNvPr>
-          <p:cNvSpPr>
-            <a:spLocks noGrp="1"/>
-          </p:cNvSpPr>
-          <p:nvPr>
-            <p:ph type="title"/>
-          </p:nvPr>
-        </p:nvSpPr>
-        <p:spPr/>
-        <p:txBody>
-          <a:bodyPr/>
-          <a:lstStyle/>
-          <a:p>
-            <a:r>
-              <a:rPr lang="en-US" dirty="0"/>
-              <a:t>Resources</a:t>
-            </a:r>
-          </a:p>
-        </p:txBody>
-      </p:sp>
-      <p:sp>
-        <p:nvSpPr>
-          <p:cNvPr id="3" name="Content Placeholder 2">
-            <a:extLst>
-              <a:ext uri="{FF2B5EF4-FFF2-40B4-BE49-F238E27FC236}">
-                <a16:creationId xmlns:a16="http://schemas.microsoft.com/office/drawing/2014/main" id="{613FB829-5B32-2E3B-5CC1-2451EE257CC2}"/>
-              </a:ext>
-            </a:extLst>
-          </p:cNvPr>
-          <p:cNvSpPr>
-            <a:spLocks noGrp="1"/>
-          </p:cNvSpPr>
-          <p:nvPr>
-            <p:ph idx="1"/>
-          </p:nvPr>
-        </p:nvSpPr>
-        <p:spPr/>
-        <p:txBody>
-          <a:bodyPr/>
-          <a:lstStyle/>
-          <a:p>
-            <a:r>
-              <a:rPr lang="en-US" dirty="0"/>
-              <a:t>This class</a:t>
-            </a:r>
-          </a:p>
-          <a:p>
-            <a:r>
-              <a:rPr lang="en-US" b="0" i="0" u="none" strike="noStrike" dirty="0">
-                <a:effectLst/>
-                <a:latin typeface="Roboto" panose="02000000000000000000" pitchFamily="2" charset="0"/>
-                <a:hlinkClick r:id="rId2"/>
-              </a:rPr>
-              <a:t>https://foodmine-new.herokuapp.com</a:t>
-            </a:r>
-            <a:endParaRPr lang="en-US" b="0" i="0" u="none" strike="noStrike" dirty="0">
-              <a:effectLst/>
-              <a:latin typeface="Roboto" panose="02000000000000000000" pitchFamily="2" charset="0"/>
-            </a:endParaRPr>
-          </a:p>
-          <a:p>
-            <a:r>
-              <a:rPr lang="en-US" dirty="0">
-                <a:latin typeface="Roboto" panose="02000000000000000000" pitchFamily="2" charset="0"/>
-              </a:rPr>
-              <a:t>ChatGPT: SCSS, Compilation Errors, especially imports</a:t>
-            </a:r>
-            <a:endParaRPr lang="en-US" dirty="0"/>
-          </a:p>
-        </p:txBody>
-      </p:sp>
-    </p:spTree>
-    <p:extLst>
-      <p:ext uri="{BB962C8B-B14F-4D97-AF65-F5344CB8AC3E}">
-        <p14:creationId xmlns:p14="http://schemas.microsoft.com/office/powerpoint/2010/main" val="3206659042"/>
-      </p:ext>
-    </p:extLst>
-  </p:cSld>
-  <p:clrMapOvr>
-    <a:masterClrMapping/>
-  </p:clrMapOvr>
-</p:sld>
-</file>
-
 <file path=ppt/slides/slide2.xml><?xml version="1.0" encoding="utf-8"?>
 <p:sld xmlns:a="http://schemas.openxmlformats.org/drawingml/2006/main" xmlns:r="http://schemas.openxmlformats.org/officeDocument/2006/relationships" xmlns:p="http://schemas.openxmlformats.org/presentationml/2006/main">
   <p:cSld>
@@ -4957,6 +4744,526 @@
           <p:cNvPr id="2" name="Title 1">
             <a:extLst>
               <a:ext uri="{FF2B5EF4-FFF2-40B4-BE49-F238E27FC236}">
+                <a16:creationId xmlns:a16="http://schemas.microsoft.com/office/drawing/2014/main" id="{9CC06D26-F368-1E45-450D-433368A7C8F3}"/>
+              </a:ext>
+            </a:extLst>
+          </p:cNvPr>
+          <p:cNvSpPr>
+            <a:spLocks noGrp="1"/>
+          </p:cNvSpPr>
+          <p:nvPr>
+            <p:ph type="title"/>
+          </p:nvPr>
+        </p:nvSpPr>
+        <p:spPr/>
+        <p:txBody>
+          <a:bodyPr/>
+          <a:lstStyle/>
+          <a:p>
+            <a:r>
+              <a:rPr lang="en-US" dirty="0"/>
+              <a:t>Security</a:t>
+            </a:r>
+          </a:p>
+        </p:txBody>
+      </p:sp>
+      <p:sp>
+        <p:nvSpPr>
+          <p:cNvPr id="3" name="Content Placeholder 2">
+            <a:extLst>
+              <a:ext uri="{FF2B5EF4-FFF2-40B4-BE49-F238E27FC236}">
+                <a16:creationId xmlns:a16="http://schemas.microsoft.com/office/drawing/2014/main" id="{7A98AAB6-3689-0359-AD35-BF41BACC7F94}"/>
+              </a:ext>
+            </a:extLst>
+          </p:cNvPr>
+          <p:cNvSpPr>
+            <a:spLocks noGrp="1"/>
+          </p:cNvSpPr>
+          <p:nvPr>
+            <p:ph idx="1"/>
+          </p:nvPr>
+        </p:nvSpPr>
+        <p:spPr>
+          <a:xfrm>
+            <a:off x="838200" y="1825624"/>
+            <a:ext cx="10515600" cy="4875213"/>
+          </a:xfrm>
+        </p:spPr>
+        <p:txBody>
+          <a:bodyPr>
+            <a:normAutofit fontScale="92500"/>
+          </a:bodyPr>
+          <a:lstStyle/>
+          <a:p>
+            <a:r>
+              <a:rPr lang="en-US" dirty="0"/>
+              <a:t>Encrypting Password: </a:t>
+            </a:r>
+          </a:p>
+          <a:p>
+            <a:pPr marL="0" indent="0">
+              <a:buNone/>
+            </a:pPr>
+            <a:r>
+              <a:rPr lang="en-US" sz="2000" dirty="0">
+                <a:solidFill>
+                  <a:srgbClr val="569CD6"/>
+                </a:solidFill>
+                <a:latin typeface="Consolas" panose="020B0609020204030204" pitchFamily="49" charset="0"/>
+              </a:rPr>
+              <a:t>  </a:t>
+            </a:r>
+            <a:r>
+              <a:rPr lang="en-US" sz="2600" dirty="0">
+                <a:solidFill>
+                  <a:schemeClr val="accent2">
+                    <a:lumMod val="75000"/>
+                  </a:schemeClr>
+                </a:solidFill>
+                <a:latin typeface="Consolas" panose="020B0609020204030204" pitchFamily="49" charset="0"/>
+              </a:rPr>
+              <a:t>const </a:t>
+            </a:r>
+            <a:r>
+              <a:rPr lang="en-US" sz="2600" dirty="0" err="1">
+                <a:solidFill>
+                  <a:schemeClr val="accent2">
+                    <a:lumMod val="75000"/>
+                  </a:schemeClr>
+                </a:solidFill>
+                <a:latin typeface="Consolas" panose="020B0609020204030204" pitchFamily="49" charset="0"/>
+              </a:rPr>
+              <a:t>encryptedPassword</a:t>
+            </a:r>
+            <a:r>
+              <a:rPr lang="en-US" sz="2600" dirty="0">
+                <a:solidFill>
+                  <a:schemeClr val="accent2">
+                    <a:lumMod val="75000"/>
+                  </a:schemeClr>
+                </a:solidFill>
+                <a:latin typeface="Consolas" panose="020B0609020204030204" pitchFamily="49" charset="0"/>
+              </a:rPr>
+              <a:t> = await </a:t>
+            </a:r>
+            <a:r>
+              <a:rPr lang="en-US" sz="2600" dirty="0" err="1">
+                <a:solidFill>
+                  <a:schemeClr val="accent2">
+                    <a:lumMod val="75000"/>
+                  </a:schemeClr>
+                </a:solidFill>
+                <a:latin typeface="Consolas" panose="020B0609020204030204" pitchFamily="49" charset="0"/>
+              </a:rPr>
+              <a:t>bcrypt.hash</a:t>
+            </a:r>
+            <a:r>
+              <a:rPr lang="en-US" sz="2600" dirty="0">
+                <a:solidFill>
+                  <a:schemeClr val="accent2">
+                    <a:lumMod val="75000"/>
+                  </a:schemeClr>
+                </a:solidFill>
+                <a:latin typeface="Consolas" panose="020B0609020204030204" pitchFamily="49" charset="0"/>
+              </a:rPr>
+              <a:t>(password, 10);</a:t>
+            </a:r>
+          </a:p>
+          <a:p>
+            <a:pPr marL="0" indent="0">
+              <a:buNone/>
+            </a:pPr>
+            <a:endParaRPr lang="en-US" dirty="0"/>
+          </a:p>
+          <a:p>
+            <a:pPr marL="0" indent="0">
+              <a:buNone/>
+            </a:pPr>
+            <a:endParaRPr lang="en-US" dirty="0"/>
+          </a:p>
+          <a:p>
+            <a:pPr marL="0" indent="0">
+              <a:buNone/>
+            </a:pPr>
+            <a:endParaRPr lang="en-US" dirty="0"/>
+          </a:p>
+          <a:p>
+            <a:r>
+              <a:rPr lang="en-US" dirty="0"/>
+              <a:t>Authenticating with Guard: Validates user’s access</a:t>
+            </a:r>
+          </a:p>
+          <a:p>
+            <a:pPr marL="0" indent="0">
+              <a:buNone/>
+            </a:pPr>
+            <a:r>
+              <a:rPr lang="en-US" dirty="0"/>
+              <a:t>   </a:t>
+            </a:r>
+            <a:r>
+              <a:rPr lang="en-US" dirty="0">
+                <a:solidFill>
+                  <a:schemeClr val="accent2">
+                    <a:lumMod val="75000"/>
+                  </a:schemeClr>
+                </a:solidFill>
+                <a:latin typeface="Consolas" panose="020B0609020204030204" pitchFamily="49" charset="0"/>
+              </a:rPr>
+              <a:t>ng g guard auth</a:t>
+            </a:r>
+          </a:p>
+          <a:p>
+            <a:r>
+              <a:rPr lang="en-US" dirty="0"/>
+              <a:t>Add authentication Token: Attach authentication tokens and credential</a:t>
+            </a:r>
+          </a:p>
+          <a:p>
+            <a:pPr marL="0" indent="0">
+              <a:lnSpc>
+                <a:spcPct val="100000"/>
+              </a:lnSpc>
+              <a:buNone/>
+            </a:pPr>
+            <a:r>
+              <a:rPr lang="en-US" dirty="0"/>
+              <a:t>   </a:t>
+            </a:r>
+            <a:r>
+              <a:rPr lang="en-US" dirty="0">
+                <a:solidFill>
+                  <a:schemeClr val="accent2">
+                    <a:lumMod val="75000"/>
+                  </a:schemeClr>
+                </a:solidFill>
+                <a:latin typeface="Consolas" panose="020B0609020204030204" pitchFamily="49" charset="0"/>
+              </a:rPr>
+              <a:t>ng g interceptor auth</a:t>
+            </a:r>
+          </a:p>
+          <a:p>
+            <a:r>
+              <a:rPr lang="en-US" dirty="0"/>
+              <a:t>Authentication with Username and Password</a:t>
+            </a:r>
+          </a:p>
+        </p:txBody>
+      </p:sp>
+      <p:pic>
+        <p:nvPicPr>
+          <p:cNvPr id="5" name="Picture 4">
+            <a:extLst>
+              <a:ext uri="{FF2B5EF4-FFF2-40B4-BE49-F238E27FC236}">
+                <a16:creationId xmlns:a16="http://schemas.microsoft.com/office/drawing/2014/main" id="{327B2DE7-31EC-C915-5C17-A47483D8686E}"/>
+              </a:ext>
+            </a:extLst>
+          </p:cNvPr>
+          <p:cNvPicPr>
+            <a:picLocks noChangeAspect="1"/>
+          </p:cNvPicPr>
+          <p:nvPr/>
+        </p:nvPicPr>
+        <p:blipFill>
+          <a:blip r:embed="rId2"/>
+          <a:stretch>
+            <a:fillRect/>
+          </a:stretch>
+        </p:blipFill>
+        <p:spPr>
+          <a:xfrm>
+            <a:off x="2943018" y="2763078"/>
+            <a:ext cx="5610225" cy="914400"/>
+          </a:xfrm>
+          <a:prstGeom prst="rect">
+            <a:avLst/>
+          </a:prstGeom>
+        </p:spPr>
+      </p:pic>
+      <p:sp>
+        <p:nvSpPr>
+          <p:cNvPr id="6" name="Rectangle 5">
+            <a:extLst>
+              <a:ext uri="{FF2B5EF4-FFF2-40B4-BE49-F238E27FC236}">
+                <a16:creationId xmlns:a16="http://schemas.microsoft.com/office/drawing/2014/main" id="{590141D1-38AC-ECA0-784B-C941687999EA}"/>
+              </a:ext>
+            </a:extLst>
+          </p:cNvPr>
+          <p:cNvSpPr/>
+          <p:nvPr/>
+        </p:nvSpPr>
+        <p:spPr>
+          <a:xfrm>
+            <a:off x="5748130" y="2844205"/>
+            <a:ext cx="1252331" cy="228600"/>
+          </a:xfrm>
+          <a:prstGeom prst="rect">
+            <a:avLst/>
+          </a:prstGeom>
+          <a:noFill/>
+        </p:spPr>
+        <p:style>
+          <a:lnRef idx="2">
+            <a:schemeClr val="accent1">
+              <a:shade val="15000"/>
+            </a:schemeClr>
+          </a:lnRef>
+          <a:fillRef idx="1">
+            <a:schemeClr val="accent1"/>
+          </a:fillRef>
+          <a:effectRef idx="0">
+            <a:schemeClr val="accent1"/>
+          </a:effectRef>
+          <a:fontRef idx="minor">
+            <a:schemeClr val="lt1"/>
+          </a:fontRef>
+        </p:style>
+        <p:txBody>
+          <a:bodyPr rtlCol="0" anchor="ctr"/>
+          <a:lstStyle/>
+          <a:p>
+            <a:pPr algn="ctr"/>
+            <a:r>
+              <a:rPr lang="en-US" dirty="0">
+                <a:solidFill>
+                  <a:schemeClr val="bg1"/>
+                </a:solidFill>
+              </a:rPr>
+              <a:t>12345</a:t>
+            </a:r>
+          </a:p>
+        </p:txBody>
+      </p:sp>
+    </p:spTree>
+    <p:extLst>
+      <p:ext uri="{BB962C8B-B14F-4D97-AF65-F5344CB8AC3E}">
+        <p14:creationId xmlns:p14="http://schemas.microsoft.com/office/powerpoint/2010/main" val="4280587274"/>
+      </p:ext>
+    </p:extLst>
+  </p:cSld>
+  <p:clrMapOvr>
+    <a:masterClrMapping/>
+  </p:clrMapOvr>
+</p:sld>
+</file>
+
+<file path=ppt/slides/slide21.xml><?xml version="1.0" encoding="utf-8"?>
+<p:sld xmlns:a="http://schemas.openxmlformats.org/drawingml/2006/main" xmlns:r="http://schemas.openxmlformats.org/officeDocument/2006/relationships" xmlns:p="http://schemas.openxmlformats.org/presentationml/2006/main">
+  <p:cSld>
+    <p:spTree>
+      <p:nvGrpSpPr>
+        <p:cNvPr id="1" name=""/>
+        <p:cNvGrpSpPr/>
+        <p:nvPr/>
+      </p:nvGrpSpPr>
+      <p:grpSpPr>
+        <a:xfrm>
+          <a:off x="0" y="0"/>
+          <a:ext cx="0" cy="0"/>
+          <a:chOff x="0" y="0"/>
+          <a:chExt cx="0" cy="0"/>
+        </a:xfrm>
+      </p:grpSpPr>
+      <p:sp>
+        <p:nvSpPr>
+          <p:cNvPr id="2" name="Title 1">
+            <a:extLst>
+              <a:ext uri="{FF2B5EF4-FFF2-40B4-BE49-F238E27FC236}">
+                <a16:creationId xmlns:a16="http://schemas.microsoft.com/office/drawing/2014/main" id="{176307F7-9C7C-0409-D4B7-A1A9EE479207}"/>
+              </a:ext>
+            </a:extLst>
+          </p:cNvPr>
+          <p:cNvSpPr>
+            <a:spLocks noGrp="1"/>
+          </p:cNvSpPr>
+          <p:nvPr>
+            <p:ph type="title"/>
+          </p:nvPr>
+        </p:nvSpPr>
+        <p:spPr/>
+        <p:txBody>
+          <a:bodyPr/>
+          <a:lstStyle/>
+          <a:p>
+            <a:r>
+              <a:rPr lang="en-US" dirty="0"/>
+              <a:t>Lesson learned</a:t>
+            </a:r>
+          </a:p>
+        </p:txBody>
+      </p:sp>
+      <p:sp>
+        <p:nvSpPr>
+          <p:cNvPr id="3" name="Content Placeholder 2">
+            <a:extLst>
+              <a:ext uri="{FF2B5EF4-FFF2-40B4-BE49-F238E27FC236}">
+                <a16:creationId xmlns:a16="http://schemas.microsoft.com/office/drawing/2014/main" id="{A64355DE-46E2-D4EF-F04E-36B94BA8DDC6}"/>
+              </a:ext>
+            </a:extLst>
+          </p:cNvPr>
+          <p:cNvSpPr>
+            <a:spLocks noGrp="1"/>
+          </p:cNvSpPr>
+          <p:nvPr>
+            <p:ph idx="1"/>
+          </p:nvPr>
+        </p:nvSpPr>
+        <p:spPr/>
+        <p:txBody>
+          <a:bodyPr/>
+          <a:lstStyle/>
+          <a:p>
+            <a:r>
+              <a:rPr lang="en-US" dirty="0"/>
+              <a:t>Work on Software Design first</a:t>
+            </a:r>
+          </a:p>
+        </p:txBody>
+      </p:sp>
+    </p:spTree>
+    <p:extLst>
+      <p:ext uri="{BB962C8B-B14F-4D97-AF65-F5344CB8AC3E}">
+        <p14:creationId xmlns:p14="http://schemas.microsoft.com/office/powerpoint/2010/main" val="4260835562"/>
+      </p:ext>
+    </p:extLst>
+  </p:cSld>
+  <p:clrMapOvr>
+    <a:masterClrMapping/>
+  </p:clrMapOvr>
+</p:sld>
+</file>
+
+<file path=ppt/slides/slide22.xml><?xml version="1.0" encoding="utf-8"?>
+<p:sld xmlns:a="http://schemas.openxmlformats.org/drawingml/2006/main" xmlns:r="http://schemas.openxmlformats.org/officeDocument/2006/relationships" xmlns:p="http://schemas.openxmlformats.org/presentationml/2006/main">
+  <p:cSld>
+    <p:spTree>
+      <p:nvGrpSpPr>
+        <p:cNvPr id="1" name=""/>
+        <p:cNvGrpSpPr/>
+        <p:nvPr/>
+      </p:nvGrpSpPr>
+      <p:grpSpPr>
+        <a:xfrm>
+          <a:off x="0" y="0"/>
+          <a:ext cx="0" cy="0"/>
+          <a:chOff x="0" y="0"/>
+          <a:chExt cx="0" cy="0"/>
+        </a:xfrm>
+      </p:grpSpPr>
+      <p:sp>
+        <p:nvSpPr>
+          <p:cNvPr id="2" name="Title 1">
+            <a:extLst>
+              <a:ext uri="{FF2B5EF4-FFF2-40B4-BE49-F238E27FC236}">
+                <a16:creationId xmlns:a16="http://schemas.microsoft.com/office/drawing/2014/main" id="{95199C25-EDB0-2F7C-3100-6037A924CAB2}"/>
+              </a:ext>
+            </a:extLst>
+          </p:cNvPr>
+          <p:cNvSpPr>
+            <a:spLocks noGrp="1"/>
+          </p:cNvSpPr>
+          <p:nvPr>
+            <p:ph type="title"/>
+          </p:nvPr>
+        </p:nvSpPr>
+        <p:spPr/>
+        <p:txBody>
+          <a:bodyPr/>
+          <a:lstStyle/>
+          <a:p>
+            <a:r>
+              <a:rPr lang="en-US" dirty="0"/>
+              <a:t>Resources</a:t>
+            </a:r>
+          </a:p>
+        </p:txBody>
+      </p:sp>
+      <p:sp>
+        <p:nvSpPr>
+          <p:cNvPr id="3" name="Content Placeholder 2">
+            <a:extLst>
+              <a:ext uri="{FF2B5EF4-FFF2-40B4-BE49-F238E27FC236}">
+                <a16:creationId xmlns:a16="http://schemas.microsoft.com/office/drawing/2014/main" id="{613FB829-5B32-2E3B-5CC1-2451EE257CC2}"/>
+              </a:ext>
+            </a:extLst>
+          </p:cNvPr>
+          <p:cNvSpPr>
+            <a:spLocks noGrp="1"/>
+          </p:cNvSpPr>
+          <p:nvPr>
+            <p:ph idx="1"/>
+          </p:nvPr>
+        </p:nvSpPr>
+        <p:spPr/>
+        <p:txBody>
+          <a:bodyPr/>
+          <a:lstStyle/>
+          <a:p>
+            <a:r>
+              <a:rPr lang="en-US" dirty="0"/>
+              <a:t>This class</a:t>
+            </a:r>
+          </a:p>
+          <a:p>
+            <a:r>
+              <a:rPr lang="en-US" b="0" i="0" u="none" strike="noStrike" dirty="0">
+                <a:effectLst/>
+                <a:latin typeface="Roboto" panose="02000000000000000000" pitchFamily="2" charset="0"/>
+                <a:hlinkClick r:id="rId2"/>
+              </a:rPr>
+              <a:t>https://foodmine-new.herokuapp.com</a:t>
+            </a:r>
+            <a:endParaRPr lang="en-US" b="0" i="0" u="none" strike="noStrike" dirty="0">
+              <a:effectLst/>
+              <a:latin typeface="Roboto" panose="02000000000000000000" pitchFamily="2" charset="0"/>
+            </a:endParaRPr>
+          </a:p>
+          <a:p>
+            <a:r>
+              <a:rPr lang="en-US" dirty="0">
+                <a:latin typeface="Roboto" panose="02000000000000000000" pitchFamily="2" charset="0"/>
+              </a:rPr>
+              <a:t>ChatGPT: SCSS, Compilation Errors, especially imports</a:t>
+            </a:r>
+            <a:endParaRPr lang="en-US" dirty="0"/>
+          </a:p>
+        </p:txBody>
+      </p:sp>
+    </p:spTree>
+    <p:extLst>
+      <p:ext uri="{BB962C8B-B14F-4D97-AF65-F5344CB8AC3E}">
+        <p14:creationId xmlns:p14="http://schemas.microsoft.com/office/powerpoint/2010/main" val="3206659042"/>
+      </p:ext>
+    </p:extLst>
+  </p:cSld>
+  <p:clrMapOvr>
+    <a:masterClrMapping/>
+  </p:clrMapOvr>
+</p:sld>
+</file>
+
+<file path=ppt/slides/slide23.xml><?xml version="1.0" encoding="utf-8"?>
+<p:sld xmlns:a="http://schemas.openxmlformats.org/drawingml/2006/main" xmlns:r="http://schemas.openxmlformats.org/officeDocument/2006/relationships" xmlns:p="http://schemas.openxmlformats.org/presentationml/2006/main">
+  <p:cSld>
+    <p:spTree>
+      <p:nvGrpSpPr>
+        <p:cNvPr id="1" name=""/>
+        <p:cNvGrpSpPr/>
+        <p:nvPr/>
+      </p:nvGrpSpPr>
+      <p:grpSpPr>
+        <a:xfrm>
+          <a:off x="0" y="0"/>
+          <a:ext cx="0" cy="0"/>
+          <a:chOff x="0" y="0"/>
+          <a:chExt cx="0" cy="0"/>
+        </a:xfrm>
+      </p:grpSpPr>
+      <p:sp>
+        <p:nvSpPr>
+          <p:cNvPr id="2" name="Title 1">
+            <a:extLst>
+              <a:ext uri="{FF2B5EF4-FFF2-40B4-BE49-F238E27FC236}">
                 <a16:creationId xmlns:a16="http://schemas.microsoft.com/office/drawing/2014/main" id="{241110D5-9B44-2D28-1CE1-E70FF31727E6}"/>
               </a:ext>
             </a:extLst>
@@ -5015,7 +5322,7 @@
 </p:sld>
 </file>
 
-<file path=ppt/slides/slide21.xml><?xml version="1.0" encoding="utf-8"?>
+<file path=ppt/slides/slide24.xml><?xml version="1.0" encoding="utf-8"?>
 <p:sld xmlns:a="http://schemas.openxmlformats.org/drawingml/2006/main" xmlns:r="http://schemas.openxmlformats.org/officeDocument/2006/relationships" xmlns:p="http://schemas.openxmlformats.org/presentationml/2006/main">
   <p:cSld>
     <p:spTree>
@@ -5708,6 +6015,366 @@
           <p:cNvPr id="2" name="Title 1">
             <a:extLst>
               <a:ext uri="{FF2B5EF4-FFF2-40B4-BE49-F238E27FC236}">
+                <a16:creationId xmlns:a16="http://schemas.microsoft.com/office/drawing/2014/main" id="{63AB85AF-6CD4-70B0-8DA5-500DE073FDE0}"/>
+              </a:ext>
+            </a:extLst>
+          </p:cNvPr>
+          <p:cNvSpPr>
+            <a:spLocks noGrp="1"/>
+          </p:cNvSpPr>
+          <p:nvPr>
+            <p:ph type="title"/>
+          </p:nvPr>
+        </p:nvSpPr>
+        <p:spPr/>
+        <p:txBody>
+          <a:bodyPr/>
+          <a:lstStyle/>
+          <a:p>
+            <a:endParaRPr lang="en-US"/>
+          </a:p>
+        </p:txBody>
+      </p:sp>
+      <p:sp>
+        <p:nvSpPr>
+          <p:cNvPr id="3" name="Content Placeholder 2">
+            <a:extLst>
+              <a:ext uri="{FF2B5EF4-FFF2-40B4-BE49-F238E27FC236}">
+                <a16:creationId xmlns:a16="http://schemas.microsoft.com/office/drawing/2014/main" id="{1848FA6A-C557-FAB0-6D91-CFAA2203036E}"/>
+              </a:ext>
+            </a:extLst>
+          </p:cNvPr>
+          <p:cNvSpPr>
+            <a:spLocks noGrp="1"/>
+          </p:cNvSpPr>
+          <p:nvPr>
+            <p:ph idx="1"/>
+          </p:nvPr>
+        </p:nvSpPr>
+        <p:spPr/>
+        <p:txBody>
+          <a:bodyPr/>
+          <a:lstStyle/>
+          <a:p>
+            <a:endParaRPr lang="en-US"/>
+          </a:p>
+        </p:txBody>
+      </p:sp>
+      <p:pic>
+        <p:nvPicPr>
+          <p:cNvPr id="5" name="Picture 4">
+            <a:extLst>
+              <a:ext uri="{FF2B5EF4-FFF2-40B4-BE49-F238E27FC236}">
+                <a16:creationId xmlns:a16="http://schemas.microsoft.com/office/drawing/2014/main" id="{9C339611-2F26-2CD3-59D7-E1E99AA4003D}"/>
+              </a:ext>
+            </a:extLst>
+          </p:cNvPr>
+          <p:cNvPicPr>
+            <a:picLocks noChangeAspect="1"/>
+          </p:cNvPicPr>
+          <p:nvPr/>
+        </p:nvPicPr>
+        <p:blipFill>
+          <a:blip r:embed="rId2"/>
+          <a:stretch>
+            <a:fillRect/>
+          </a:stretch>
+        </p:blipFill>
+        <p:spPr>
+          <a:xfrm>
+            <a:off x="0" y="841855"/>
+            <a:ext cx="12192000" cy="5174290"/>
+          </a:xfrm>
+          <a:prstGeom prst="rect">
+            <a:avLst/>
+          </a:prstGeom>
+        </p:spPr>
+      </p:pic>
+    </p:spTree>
+    <p:extLst>
+      <p:ext uri="{BB962C8B-B14F-4D97-AF65-F5344CB8AC3E}">
+        <p14:creationId xmlns:p14="http://schemas.microsoft.com/office/powerpoint/2010/main" val="1260871524"/>
+      </p:ext>
+    </p:extLst>
+  </p:cSld>
+  <p:clrMapOvr>
+    <a:masterClrMapping/>
+  </p:clrMapOvr>
+</p:sld>
+</file>
+
+<file path=ppt/slides/slide7.xml><?xml version="1.0" encoding="utf-8"?>
+<p:sld xmlns:a="http://schemas.openxmlformats.org/drawingml/2006/main" xmlns:r="http://schemas.openxmlformats.org/officeDocument/2006/relationships" xmlns:p="http://schemas.openxmlformats.org/presentationml/2006/main">
+  <p:cSld>
+    <p:spTree>
+      <p:nvGrpSpPr>
+        <p:cNvPr id="1" name=""/>
+        <p:cNvGrpSpPr/>
+        <p:nvPr/>
+      </p:nvGrpSpPr>
+      <p:grpSpPr>
+        <a:xfrm>
+          <a:off x="0" y="0"/>
+          <a:ext cx="0" cy="0"/>
+          <a:chOff x="0" y="0"/>
+          <a:chExt cx="0" cy="0"/>
+        </a:xfrm>
+      </p:grpSpPr>
+      <p:sp>
+        <p:nvSpPr>
+          <p:cNvPr id="2" name="Title 1">
+            <a:extLst>
+              <a:ext uri="{FF2B5EF4-FFF2-40B4-BE49-F238E27FC236}">
+                <a16:creationId xmlns:a16="http://schemas.microsoft.com/office/drawing/2014/main" id="{B529A78A-0DC6-3B94-5F4F-A174335C4EB6}"/>
+              </a:ext>
+            </a:extLst>
+          </p:cNvPr>
+          <p:cNvSpPr>
+            <a:spLocks noGrp="1"/>
+          </p:cNvSpPr>
+          <p:nvPr>
+            <p:ph type="title"/>
+          </p:nvPr>
+        </p:nvSpPr>
+        <p:spPr/>
+        <p:txBody>
+          <a:bodyPr/>
+          <a:lstStyle/>
+          <a:p>
+            <a:endParaRPr lang="en-US"/>
+          </a:p>
+        </p:txBody>
+      </p:sp>
+      <p:sp>
+        <p:nvSpPr>
+          <p:cNvPr id="3" name="Content Placeholder 2">
+            <a:extLst>
+              <a:ext uri="{FF2B5EF4-FFF2-40B4-BE49-F238E27FC236}">
+                <a16:creationId xmlns:a16="http://schemas.microsoft.com/office/drawing/2014/main" id="{238C42D3-2E82-54CC-0088-3FFDA27C0F29}"/>
+              </a:ext>
+            </a:extLst>
+          </p:cNvPr>
+          <p:cNvSpPr>
+            <a:spLocks noGrp="1"/>
+          </p:cNvSpPr>
+          <p:nvPr>
+            <p:ph idx="1"/>
+          </p:nvPr>
+        </p:nvSpPr>
+        <p:spPr/>
+        <p:txBody>
+          <a:bodyPr/>
+          <a:lstStyle/>
+          <a:p>
+            <a:endParaRPr lang="en-US"/>
+          </a:p>
+        </p:txBody>
+      </p:sp>
+      <p:pic>
+        <p:nvPicPr>
+          <p:cNvPr id="5" name="Picture 4">
+            <a:extLst>
+              <a:ext uri="{FF2B5EF4-FFF2-40B4-BE49-F238E27FC236}">
+                <a16:creationId xmlns:a16="http://schemas.microsoft.com/office/drawing/2014/main" id="{3B02B494-74F4-5C94-D4D0-F33DA326EEA3}"/>
+              </a:ext>
+            </a:extLst>
+          </p:cNvPr>
+          <p:cNvPicPr>
+            <a:picLocks noChangeAspect="1"/>
+          </p:cNvPicPr>
+          <p:nvPr/>
+        </p:nvPicPr>
+        <p:blipFill>
+          <a:blip r:embed="rId2"/>
+          <a:stretch>
+            <a:fillRect/>
+          </a:stretch>
+        </p:blipFill>
+        <p:spPr>
+          <a:xfrm>
+            <a:off x="4176712" y="1195387"/>
+            <a:ext cx="3838575" cy="4467225"/>
+          </a:xfrm>
+          <a:prstGeom prst="rect">
+            <a:avLst/>
+          </a:prstGeom>
+        </p:spPr>
+      </p:pic>
+      <p:pic>
+        <p:nvPicPr>
+          <p:cNvPr id="7" name="Picture 6">
+            <a:extLst>
+              <a:ext uri="{FF2B5EF4-FFF2-40B4-BE49-F238E27FC236}">
+                <a16:creationId xmlns:a16="http://schemas.microsoft.com/office/drawing/2014/main" id="{F9E91E71-75A4-E6DA-1EAF-96610F65EBD6}"/>
+              </a:ext>
+            </a:extLst>
+          </p:cNvPr>
+          <p:cNvPicPr>
+            <a:picLocks noChangeAspect="1"/>
+          </p:cNvPicPr>
+          <p:nvPr/>
+        </p:nvPicPr>
+        <p:blipFill>
+          <a:blip r:embed="rId3"/>
+          <a:stretch>
+            <a:fillRect/>
+          </a:stretch>
+        </p:blipFill>
+        <p:spPr>
+          <a:xfrm>
+            <a:off x="0" y="1135046"/>
+            <a:ext cx="12192000" cy="4587908"/>
+          </a:xfrm>
+          <a:prstGeom prst="rect">
+            <a:avLst/>
+          </a:prstGeom>
+        </p:spPr>
+      </p:pic>
+    </p:spTree>
+    <p:extLst>
+      <p:ext uri="{BB962C8B-B14F-4D97-AF65-F5344CB8AC3E}">
+        <p14:creationId xmlns:p14="http://schemas.microsoft.com/office/powerpoint/2010/main" val="1729357968"/>
+      </p:ext>
+    </p:extLst>
+  </p:cSld>
+  <p:clrMapOvr>
+    <a:masterClrMapping/>
+  </p:clrMapOvr>
+</p:sld>
+</file>
+
+<file path=ppt/slides/slide8.xml><?xml version="1.0" encoding="utf-8"?>
+<p:sld xmlns:a="http://schemas.openxmlformats.org/drawingml/2006/main" xmlns:r="http://schemas.openxmlformats.org/officeDocument/2006/relationships" xmlns:p="http://schemas.openxmlformats.org/presentationml/2006/main">
+  <p:cSld>
+    <p:spTree>
+      <p:nvGrpSpPr>
+        <p:cNvPr id="1" name=""/>
+        <p:cNvGrpSpPr/>
+        <p:nvPr/>
+      </p:nvGrpSpPr>
+      <p:grpSpPr>
+        <a:xfrm>
+          <a:off x="0" y="0"/>
+          <a:ext cx="0" cy="0"/>
+          <a:chOff x="0" y="0"/>
+          <a:chExt cx="0" cy="0"/>
+        </a:xfrm>
+      </p:grpSpPr>
+      <p:sp>
+        <p:nvSpPr>
+          <p:cNvPr id="2" name="Title 1">
+            <a:extLst>
+              <a:ext uri="{FF2B5EF4-FFF2-40B4-BE49-F238E27FC236}">
+                <a16:creationId xmlns:a16="http://schemas.microsoft.com/office/drawing/2014/main" id="{91851611-F47F-8C49-2096-EC5F10996707}"/>
+              </a:ext>
+            </a:extLst>
+          </p:cNvPr>
+          <p:cNvSpPr>
+            <a:spLocks noGrp="1"/>
+          </p:cNvSpPr>
+          <p:nvPr>
+            <p:ph type="title"/>
+          </p:nvPr>
+        </p:nvSpPr>
+        <p:spPr/>
+        <p:txBody>
+          <a:bodyPr/>
+          <a:lstStyle/>
+          <a:p>
+            <a:endParaRPr lang="en-US"/>
+          </a:p>
+        </p:txBody>
+      </p:sp>
+      <p:sp>
+        <p:nvSpPr>
+          <p:cNvPr id="3" name="Content Placeholder 2">
+            <a:extLst>
+              <a:ext uri="{FF2B5EF4-FFF2-40B4-BE49-F238E27FC236}">
+                <a16:creationId xmlns:a16="http://schemas.microsoft.com/office/drawing/2014/main" id="{778C5B34-4E20-3765-234B-240FFE0FC847}"/>
+              </a:ext>
+            </a:extLst>
+          </p:cNvPr>
+          <p:cNvSpPr>
+            <a:spLocks noGrp="1"/>
+          </p:cNvSpPr>
+          <p:nvPr>
+            <p:ph idx="1"/>
+          </p:nvPr>
+        </p:nvSpPr>
+        <p:spPr/>
+        <p:txBody>
+          <a:bodyPr/>
+          <a:lstStyle/>
+          <a:p>
+            <a:endParaRPr lang="en-US"/>
+          </a:p>
+        </p:txBody>
+      </p:sp>
+      <p:pic>
+        <p:nvPicPr>
+          <p:cNvPr id="5" name="Picture 4">
+            <a:extLst>
+              <a:ext uri="{FF2B5EF4-FFF2-40B4-BE49-F238E27FC236}">
+                <a16:creationId xmlns:a16="http://schemas.microsoft.com/office/drawing/2014/main" id="{59ADFEB2-09E1-426F-3525-1A2DF68DA642}"/>
+              </a:ext>
+            </a:extLst>
+          </p:cNvPr>
+          <p:cNvPicPr>
+            <a:picLocks noChangeAspect="1"/>
+          </p:cNvPicPr>
+          <p:nvPr/>
+        </p:nvPicPr>
+        <p:blipFill>
+          <a:blip r:embed="rId2"/>
+          <a:stretch>
+            <a:fillRect/>
+          </a:stretch>
+        </p:blipFill>
+        <p:spPr>
+          <a:xfrm>
+            <a:off x="0" y="890074"/>
+            <a:ext cx="12192000" cy="5077852"/>
+          </a:xfrm>
+          <a:prstGeom prst="rect">
+            <a:avLst/>
+          </a:prstGeom>
+        </p:spPr>
+      </p:pic>
+    </p:spTree>
+    <p:extLst>
+      <p:ext uri="{BB962C8B-B14F-4D97-AF65-F5344CB8AC3E}">
+        <p14:creationId xmlns:p14="http://schemas.microsoft.com/office/powerpoint/2010/main" val="2134078266"/>
+      </p:ext>
+    </p:extLst>
+  </p:cSld>
+  <p:clrMapOvr>
+    <a:masterClrMapping/>
+  </p:clrMapOvr>
+</p:sld>
+</file>
+
+<file path=ppt/slides/slide9.xml><?xml version="1.0" encoding="utf-8"?>
+<p:sld xmlns:a="http://schemas.openxmlformats.org/drawingml/2006/main" xmlns:r="http://schemas.openxmlformats.org/officeDocument/2006/relationships" xmlns:p="http://schemas.openxmlformats.org/presentationml/2006/main">
+  <p:cSld>
+    <p:spTree>
+      <p:nvGrpSpPr>
+        <p:cNvPr id="1" name=""/>
+        <p:cNvGrpSpPr/>
+        <p:nvPr/>
+      </p:nvGrpSpPr>
+      <p:grpSpPr>
+        <a:xfrm>
+          <a:off x="0" y="0"/>
+          <a:ext cx="0" cy="0"/>
+          <a:chOff x="0" y="0"/>
+          <a:chExt cx="0" cy="0"/>
+        </a:xfrm>
+      </p:grpSpPr>
+      <p:sp>
+        <p:nvSpPr>
+          <p:cNvPr id="2" name="Title 1">
+            <a:extLst>
+              <a:ext uri="{FF2B5EF4-FFF2-40B4-BE49-F238E27FC236}">
                 <a16:creationId xmlns:a16="http://schemas.microsoft.com/office/drawing/2014/main" id="{32EBFEAC-6A6A-E763-9267-A2E9F467A418}"/>
               </a:ext>
             </a:extLst>
@@ -5881,310 +6548,6 @@
     <p:extLst>
       <p:ext uri="{BB962C8B-B14F-4D97-AF65-F5344CB8AC3E}">
         <p14:creationId xmlns:p14="http://schemas.microsoft.com/office/powerpoint/2010/main" val="2160363103"/>
-      </p:ext>
-    </p:extLst>
-  </p:cSld>
-  <p:clrMapOvr>
-    <a:masterClrMapping/>
-  </p:clrMapOvr>
-</p:sld>
-</file>
-
-<file path=ppt/slides/slide7.xml><?xml version="1.0" encoding="utf-8"?>
-<p:sld xmlns:a="http://schemas.openxmlformats.org/drawingml/2006/main" xmlns:r="http://schemas.openxmlformats.org/officeDocument/2006/relationships" xmlns:p="http://schemas.openxmlformats.org/presentationml/2006/main">
-  <p:cSld>
-    <p:spTree>
-      <p:nvGrpSpPr>
-        <p:cNvPr id="1" name=""/>
-        <p:cNvGrpSpPr/>
-        <p:nvPr/>
-      </p:nvGrpSpPr>
-      <p:grpSpPr>
-        <a:xfrm>
-          <a:off x="0" y="0"/>
-          <a:ext cx="0" cy="0"/>
-          <a:chOff x="0" y="0"/>
-          <a:chExt cx="0" cy="0"/>
-        </a:xfrm>
-      </p:grpSpPr>
-      <p:pic>
-        <p:nvPicPr>
-          <p:cNvPr id="7" name="Picture 6">
-            <a:extLst>
-              <a:ext uri="{FF2B5EF4-FFF2-40B4-BE49-F238E27FC236}">
-                <a16:creationId xmlns:a16="http://schemas.microsoft.com/office/drawing/2014/main" id="{B0C85D0E-4052-DC50-5A82-A6BAB0204701}"/>
-              </a:ext>
-            </a:extLst>
-          </p:cNvPr>
-          <p:cNvPicPr>
-            <a:picLocks noChangeAspect="1"/>
-          </p:cNvPicPr>
-          <p:nvPr/>
-        </p:nvPicPr>
-        <p:blipFill>
-          <a:blip r:embed="rId2"/>
-          <a:stretch>
-            <a:fillRect/>
-          </a:stretch>
-        </p:blipFill>
-        <p:spPr>
-          <a:xfrm>
-            <a:off x="637553" y="1357934"/>
-            <a:ext cx="8829675" cy="4400550"/>
-          </a:xfrm>
-          <a:prstGeom prst="rect">
-            <a:avLst/>
-          </a:prstGeom>
-        </p:spPr>
-      </p:pic>
-      <p:sp>
-        <p:nvSpPr>
-          <p:cNvPr id="2" name="Title 1">
-            <a:extLst>
-              <a:ext uri="{FF2B5EF4-FFF2-40B4-BE49-F238E27FC236}">
-                <a16:creationId xmlns:a16="http://schemas.microsoft.com/office/drawing/2014/main" id="{3DB27BDF-19BC-2189-BBBB-8AB5A212C081}"/>
-              </a:ext>
-            </a:extLst>
-          </p:cNvPr>
-          <p:cNvSpPr>
-            <a:spLocks noGrp="1"/>
-          </p:cNvSpPr>
-          <p:nvPr>
-            <p:ph type="title"/>
-          </p:nvPr>
-        </p:nvSpPr>
-        <p:spPr/>
-        <p:txBody>
-          <a:bodyPr/>
-          <a:lstStyle/>
-          <a:p>
-            <a:r>
-              <a:rPr lang="en-US" dirty="0"/>
-              <a:t>PayPal Sandbox Account</a:t>
-            </a:r>
-          </a:p>
-        </p:txBody>
-      </p:sp>
-      <p:pic>
-        <p:nvPicPr>
-          <p:cNvPr id="9" name="Picture 8">
-            <a:extLst>
-              <a:ext uri="{FF2B5EF4-FFF2-40B4-BE49-F238E27FC236}">
-                <a16:creationId xmlns:a16="http://schemas.microsoft.com/office/drawing/2014/main" id="{D40CCDE5-6F36-BEF2-811B-DB2967FAF748}"/>
-              </a:ext>
-            </a:extLst>
-          </p:cNvPr>
-          <p:cNvPicPr>
-            <a:picLocks noChangeAspect="1"/>
-          </p:cNvPicPr>
-          <p:nvPr/>
-        </p:nvPicPr>
-        <p:blipFill>
-          <a:blip r:embed="rId3"/>
-          <a:stretch>
-            <a:fillRect/>
-          </a:stretch>
-        </p:blipFill>
-        <p:spPr>
-          <a:xfrm>
-            <a:off x="4461442" y="2116751"/>
-            <a:ext cx="7093005" cy="4462954"/>
-          </a:xfrm>
-          <a:prstGeom prst="rect">
-            <a:avLst/>
-          </a:prstGeom>
-        </p:spPr>
-      </p:pic>
-    </p:spTree>
-    <p:extLst>
-      <p:ext uri="{BB962C8B-B14F-4D97-AF65-F5344CB8AC3E}">
-        <p14:creationId xmlns:p14="http://schemas.microsoft.com/office/powerpoint/2010/main" val="1783202218"/>
-      </p:ext>
-    </p:extLst>
-  </p:cSld>
-  <p:clrMapOvr>
-    <a:masterClrMapping/>
-  </p:clrMapOvr>
-</p:sld>
-</file>
-
-<file path=ppt/slides/slide8.xml><?xml version="1.0" encoding="utf-8"?>
-<p:sld xmlns:a="http://schemas.openxmlformats.org/drawingml/2006/main" xmlns:r="http://schemas.openxmlformats.org/officeDocument/2006/relationships" xmlns:p="http://schemas.openxmlformats.org/presentationml/2006/main">
-  <p:cSld>
-    <p:spTree>
-      <p:nvGrpSpPr>
-        <p:cNvPr id="1" name=""/>
-        <p:cNvGrpSpPr/>
-        <p:nvPr/>
-      </p:nvGrpSpPr>
-      <p:grpSpPr>
-        <a:xfrm>
-          <a:off x="0" y="0"/>
-          <a:ext cx="0" cy="0"/>
-          <a:chOff x="0" y="0"/>
-          <a:chExt cx="0" cy="0"/>
-        </a:xfrm>
-      </p:grpSpPr>
-      <p:sp>
-        <p:nvSpPr>
-          <p:cNvPr id="2" name="Title 1">
-            <a:extLst>
-              <a:ext uri="{FF2B5EF4-FFF2-40B4-BE49-F238E27FC236}">
-                <a16:creationId xmlns:a16="http://schemas.microsoft.com/office/drawing/2014/main" id="{7F668DA0-1651-1036-6E63-8BF74751E363}"/>
-              </a:ext>
-            </a:extLst>
-          </p:cNvPr>
-          <p:cNvSpPr>
-            <a:spLocks noGrp="1"/>
-          </p:cNvSpPr>
-          <p:nvPr>
-            <p:ph type="title"/>
-          </p:nvPr>
-        </p:nvSpPr>
-        <p:spPr>
-          <a:xfrm>
-            <a:off x="768626" y="0"/>
-            <a:ext cx="10515600" cy="1325563"/>
-          </a:xfrm>
-        </p:spPr>
-        <p:txBody>
-          <a:bodyPr/>
-          <a:lstStyle/>
-          <a:p>
-            <a:r>
-              <a:rPr lang="en-US" dirty="0"/>
-              <a:t>Add to Cart</a:t>
-            </a:r>
-          </a:p>
-        </p:txBody>
-      </p:sp>
-      <p:pic>
-        <p:nvPicPr>
-          <p:cNvPr id="5" name="Picture 4">
-            <a:extLst>
-              <a:ext uri="{FF2B5EF4-FFF2-40B4-BE49-F238E27FC236}">
-                <a16:creationId xmlns:a16="http://schemas.microsoft.com/office/drawing/2014/main" id="{E2F1F9E6-8074-EFD4-B4C0-768C9FFBFEA4}"/>
-              </a:ext>
-            </a:extLst>
-          </p:cNvPr>
-          <p:cNvPicPr>
-            <a:picLocks noChangeAspect="1"/>
-          </p:cNvPicPr>
-          <p:nvPr/>
-        </p:nvPicPr>
-        <p:blipFill>
-          <a:blip r:embed="rId2"/>
-          <a:stretch>
-            <a:fillRect/>
-          </a:stretch>
-        </p:blipFill>
-        <p:spPr>
-          <a:xfrm>
-            <a:off x="1381538" y="1165980"/>
-            <a:ext cx="8733061" cy="5692020"/>
-          </a:xfrm>
-          <a:prstGeom prst="rect">
-            <a:avLst/>
-          </a:prstGeom>
-        </p:spPr>
-      </p:pic>
-    </p:spTree>
-    <p:extLst>
-      <p:ext uri="{BB962C8B-B14F-4D97-AF65-F5344CB8AC3E}">
-        <p14:creationId xmlns:p14="http://schemas.microsoft.com/office/powerpoint/2010/main" val="4178321967"/>
-      </p:ext>
-    </p:extLst>
-  </p:cSld>
-  <p:clrMapOvr>
-    <a:masterClrMapping/>
-  </p:clrMapOvr>
-</p:sld>
-</file>
-
-<file path=ppt/slides/slide9.xml><?xml version="1.0" encoding="utf-8"?>
-<p:sld xmlns:a="http://schemas.openxmlformats.org/drawingml/2006/main" xmlns:r="http://schemas.openxmlformats.org/officeDocument/2006/relationships" xmlns:p="http://schemas.openxmlformats.org/presentationml/2006/main">
-  <p:cSld>
-    <p:spTree>
-      <p:nvGrpSpPr>
-        <p:cNvPr id="1" name=""/>
-        <p:cNvGrpSpPr/>
-        <p:nvPr/>
-      </p:nvGrpSpPr>
-      <p:grpSpPr>
-        <a:xfrm>
-          <a:off x="0" y="0"/>
-          <a:ext cx="0" cy="0"/>
-          <a:chOff x="0" y="0"/>
-          <a:chExt cx="0" cy="0"/>
-        </a:xfrm>
-      </p:grpSpPr>
-      <p:pic>
-        <p:nvPicPr>
-          <p:cNvPr id="5" name="Picture 4">
-            <a:extLst>
-              <a:ext uri="{FF2B5EF4-FFF2-40B4-BE49-F238E27FC236}">
-                <a16:creationId xmlns:a16="http://schemas.microsoft.com/office/drawing/2014/main" id="{BA5DE88D-31C3-A493-D3EA-1B5DE6765E60}"/>
-              </a:ext>
-            </a:extLst>
-          </p:cNvPr>
-          <p:cNvPicPr>
-            <a:picLocks noChangeAspect="1"/>
-          </p:cNvPicPr>
-          <p:nvPr/>
-        </p:nvPicPr>
-        <p:blipFill>
-          <a:blip r:embed="rId2"/>
-          <a:stretch>
-            <a:fillRect/>
-          </a:stretch>
-        </p:blipFill>
-        <p:spPr>
-          <a:xfrm>
-            <a:off x="1043609" y="974981"/>
-            <a:ext cx="10719766" cy="5206743"/>
-          </a:xfrm>
-          <a:prstGeom prst="rect">
-            <a:avLst/>
-          </a:prstGeom>
-        </p:spPr>
-      </p:pic>
-      <p:sp>
-        <p:nvSpPr>
-          <p:cNvPr id="6" name="Title 1">
-            <a:extLst>
-              <a:ext uri="{FF2B5EF4-FFF2-40B4-BE49-F238E27FC236}">
-                <a16:creationId xmlns:a16="http://schemas.microsoft.com/office/drawing/2014/main" id="{FC92EA05-0495-C6C1-8C3C-AB11D0982153}"/>
-              </a:ext>
-            </a:extLst>
-          </p:cNvPr>
-          <p:cNvSpPr>
-            <a:spLocks noGrp="1"/>
-          </p:cNvSpPr>
-          <p:nvPr>
-            <p:ph type="title"/>
-          </p:nvPr>
-        </p:nvSpPr>
-        <p:spPr>
-          <a:xfrm>
-            <a:off x="634034" y="96769"/>
-            <a:ext cx="10338766" cy="976658"/>
-          </a:xfrm>
-        </p:spPr>
-        <p:txBody>
-          <a:bodyPr/>
-          <a:lstStyle/>
-          <a:p>
-            <a:r>
-              <a:rPr lang="en-US" dirty="0"/>
-              <a:t>Add to Cart</a:t>
-            </a:r>
-          </a:p>
-        </p:txBody>
-      </p:sp>
-    </p:spTree>
-    <p:extLst>
-      <p:ext uri="{BB962C8B-B14F-4D97-AF65-F5344CB8AC3E}">
-        <p14:creationId xmlns:p14="http://schemas.microsoft.com/office/powerpoint/2010/main" val="939074690"/>
       </p:ext>
     </p:extLst>
   </p:cSld>

</xml_diff>

<commit_message>
specifying node version to publish in a webside
</commit_message>
<xml_diff>
--- a/finalProject/Software Solution Technology Presentation.pptx
+++ b/finalProject/Software Solution Technology Presentation.pptx
@@ -3340,16 +3340,6 @@
 <file path=ppt/slides/slide1.xml><?xml version="1.0" encoding="utf-8"?>
 <p:sld xmlns:a="http://schemas.openxmlformats.org/drawingml/2006/main" xmlns:r="http://schemas.openxmlformats.org/officeDocument/2006/relationships" xmlns:p="http://schemas.openxmlformats.org/presentationml/2006/main">
   <p:cSld>
-    <p:bg>
-      <p:bgPr>
-        <a:blipFill dpi="0" rotWithShape="1">
-          <a:blip r:embed="rId2"/>
-          <a:srcRect/>
-          <a:tile tx="0" ty="0" sx="100000" sy="100000" flip="none" algn="tl"/>
-        </a:blipFill>
-        <a:effectLst/>
-      </p:bgPr>
-    </p:bg>
     <p:spTree>
       <p:nvGrpSpPr>
         <p:cNvPr id="1" name=""/>
@@ -3382,7 +3372,7 @@
         </p:nvSpPr>
         <p:spPr>
           <a:xfrm>
-            <a:off x="695739" y="636103"/>
+            <a:off x="695739" y="288233"/>
             <a:ext cx="11012556" cy="1522137"/>
           </a:xfrm>
         </p:spPr>
@@ -3413,9 +3403,16 @@
             <p:ph type="subTitle" idx="1"/>
           </p:nvPr>
         </p:nvSpPr>
-        <p:spPr/>
-        <p:txBody>
-          <a:bodyPr/>
+        <p:spPr>
+          <a:xfrm>
+            <a:off x="1524000" y="3979760"/>
+            <a:ext cx="9144000" cy="2311710"/>
+          </a:xfrm>
+        </p:spPr>
+        <p:txBody>
+          <a:bodyPr>
+            <a:normAutofit/>
+          </a:bodyPr>
           <a:lstStyle/>
           <a:p>
             <a:r>
@@ -3424,6 +3421,9 @@
             </a:r>
           </a:p>
           <a:p>
+            <a:endParaRPr lang="en-US" dirty="0"/>
+          </a:p>
+          <a:p>
             <a:r>
               <a:rPr lang="en-US" dirty="0"/>
               <a:t>MSSE 663 Web Frameworks</a:t>
@@ -3432,11 +3432,47 @@
           <a:p>
             <a:r>
               <a:rPr lang="en-US" dirty="0"/>
+              <a:t>Course Prof. Jelena Vucetic</a:t>
+            </a:r>
+          </a:p>
+          <a:p>
+            <a:r>
+              <a:rPr lang="en-US" dirty="0"/>
               <a:t>Regis University</a:t>
             </a:r>
           </a:p>
         </p:txBody>
       </p:sp>
+      <p:pic>
+        <p:nvPicPr>
+          <p:cNvPr id="5" name="Picture 4">
+            <a:extLst>
+              <a:ext uri="{FF2B5EF4-FFF2-40B4-BE49-F238E27FC236}">
+                <a16:creationId xmlns:a16="http://schemas.microsoft.com/office/drawing/2014/main" id="{5F42A1F1-8390-301A-FC37-4BE9FE9EA756}"/>
+              </a:ext>
+            </a:extLst>
+          </p:cNvPr>
+          <p:cNvPicPr>
+            <a:picLocks noChangeAspect="1"/>
+          </p:cNvPicPr>
+          <p:nvPr/>
+        </p:nvPicPr>
+        <p:blipFill>
+          <a:blip r:embed="rId2"/>
+          <a:stretch>
+            <a:fillRect/>
+          </a:stretch>
+        </p:blipFill>
+        <p:spPr>
+          <a:xfrm>
+            <a:off x="5092148" y="1666875"/>
+            <a:ext cx="1828800" cy="1762125"/>
+          </a:xfrm>
+          <a:prstGeom prst="rect">
+            <a:avLst/>
+          </a:prstGeom>
+        </p:spPr>
+      </p:pic>
     </p:spTree>
     <p:extLst>
       <p:ext uri="{BB962C8B-B14F-4D97-AF65-F5344CB8AC3E}">

</xml_diff>